<commit_message>
Mejora visual al fondo de la web (cuando no  carga el giuf ahora es más oscuro el color de fondo), y mejoras en la presentación PowerPoint.
</commit_message>
<xml_diff>
--- a/documentacion_proyecto/JustTrack - Presentación - Eddyson Bueno Soto 2DAW.pptx
+++ b/documentacion_proyecto/JustTrack - Presentación - Eddyson Bueno Soto 2DAW.pptx
@@ -114,6 +114,11 @@
       </a:defRPr>
     </a:lvl9pPr>
   </p:defaultTextStyle>
+  <p:extLst>
+    <p:ext uri="{EFAFB233-063F-42B5-8137-9DF3F51BA10A}">
+      <p15:sldGuideLst xmlns:p15="http://schemas.microsoft.com/office/powerpoint/2012/main"/>
+    </p:ext>
+  </p:extLst>
 </p:presentation>
 </file>
 
@@ -10857,10 +10862,10 @@
             </a:lnSpc>
           </a:pPr>
           <a:r>
-            <a:rPr lang="es-ES"/>
-            <a:t>CSS</a:t>
+            <a:rPr lang="es-ES" dirty="0"/>
+            <a:t>CSS &amp; JavaScript</a:t>
           </a:r>
-          <a:endParaRPr lang="en-US"/>
+          <a:endParaRPr lang="en-US" dirty="0"/>
         </a:p>
       </dgm:t>
     </dgm:pt>
@@ -16377,10 +16382,10 @@
             <a:buNone/>
           </a:pPr>
           <a:r>
-            <a:rPr lang="es-ES" sz="2200" kern="1200"/>
-            <a:t>CSS</a:t>
+            <a:rPr lang="es-ES" sz="2200" kern="1200" dirty="0"/>
+            <a:t>CSS &amp; JavaScript</a:t>
           </a:r>
-          <a:endParaRPr lang="en-US" sz="2200" kern="1200"/>
+          <a:endParaRPr lang="en-US" sz="2200" kern="1200" dirty="0"/>
         </a:p>
       </dsp:txBody>
       <dsp:txXfrm>
@@ -28834,7 +28839,7 @@
           <a:p>
             <a:fld id="{8A143C70-608A-4F22-B501-746222F42BD2}" type="datetimeFigureOut">
               <a:rPr lang="es-ES" smtClean="0"/>
-              <a:t>15/06/2025</a:t>
+              <a:t>16/06/2025</a:t>
             </a:fld>
             <a:endParaRPr lang="es-ES"/>
           </a:p>
@@ -29132,7 +29137,7 @@
           <a:p>
             <a:fld id="{8A143C70-608A-4F22-B501-746222F42BD2}" type="datetimeFigureOut">
               <a:rPr lang="es-ES" smtClean="0"/>
-              <a:t>15/06/2025</a:t>
+              <a:t>16/06/2025</a:t>
             </a:fld>
             <a:endParaRPr lang="es-ES"/>
           </a:p>
@@ -29324,7 +29329,7 @@
           <a:p>
             <a:fld id="{8A143C70-608A-4F22-B501-746222F42BD2}" type="datetimeFigureOut">
               <a:rPr lang="es-ES" smtClean="0"/>
-              <a:t>15/06/2025</a:t>
+              <a:t>16/06/2025</a:t>
             </a:fld>
             <a:endParaRPr lang="es-ES"/>
           </a:p>
@@ -29585,7 +29590,7 @@
           <a:p>
             <a:fld id="{8A143C70-608A-4F22-B501-746222F42BD2}" type="datetimeFigureOut">
               <a:rPr lang="es-ES" smtClean="0"/>
-              <a:t>15/06/2025</a:t>
+              <a:t>16/06/2025</a:t>
             </a:fld>
             <a:endParaRPr lang="es-ES"/>
           </a:p>
@@ -30009,7 +30014,7 @@
           <a:p>
             <a:fld id="{8A143C70-608A-4F22-B501-746222F42BD2}" type="datetimeFigureOut">
               <a:rPr lang="es-ES" smtClean="0"/>
-              <a:t>15/06/2025</a:t>
+              <a:t>16/06/2025</a:t>
             </a:fld>
             <a:endParaRPr lang="es-ES"/>
           </a:p>
@@ -30546,7 +30551,7 @@
           <a:p>
             <a:fld id="{8A143C70-608A-4F22-B501-746222F42BD2}" type="datetimeFigureOut">
               <a:rPr lang="es-ES" smtClean="0"/>
-              <a:t>15/06/2025</a:t>
+              <a:t>16/06/2025</a:t>
             </a:fld>
             <a:endParaRPr lang="es-ES"/>
           </a:p>
@@ -31410,7 +31415,7 @@
           <a:p>
             <a:fld id="{8A143C70-608A-4F22-B501-746222F42BD2}" type="datetimeFigureOut">
               <a:rPr lang="es-ES" smtClean="0"/>
-              <a:t>15/06/2025</a:t>
+              <a:t>16/06/2025</a:t>
             </a:fld>
             <a:endParaRPr lang="es-ES"/>
           </a:p>
@@ -31580,7 +31585,7 @@
           <a:p>
             <a:fld id="{8A143C70-608A-4F22-B501-746222F42BD2}" type="datetimeFigureOut">
               <a:rPr lang="es-ES" smtClean="0"/>
-              <a:t>15/06/2025</a:t>
+              <a:t>16/06/2025</a:t>
             </a:fld>
             <a:endParaRPr lang="es-ES"/>
           </a:p>
@@ -31764,7 +31769,7 @@
           <a:p>
             <a:fld id="{8A143C70-608A-4F22-B501-746222F42BD2}" type="datetimeFigureOut">
               <a:rPr lang="es-ES" smtClean="0"/>
-              <a:t>15/06/2025</a:t>
+              <a:t>16/06/2025</a:t>
             </a:fld>
             <a:endParaRPr lang="es-ES"/>
           </a:p>
@@ -31934,7 +31939,7 @@
           <a:p>
             <a:fld id="{8A143C70-608A-4F22-B501-746222F42BD2}" type="datetimeFigureOut">
               <a:rPr lang="es-ES" smtClean="0"/>
-              <a:t>15/06/2025</a:t>
+              <a:t>16/06/2025</a:t>
             </a:fld>
             <a:endParaRPr lang="es-ES"/>
           </a:p>
@@ -32178,7 +32183,7 @@
           <a:p>
             <a:fld id="{8A143C70-608A-4F22-B501-746222F42BD2}" type="datetimeFigureOut">
               <a:rPr lang="es-ES" smtClean="0"/>
-              <a:t>15/06/2025</a:t>
+              <a:t>16/06/2025</a:t>
             </a:fld>
             <a:endParaRPr lang="es-ES"/>
           </a:p>
@@ -32414,7 +32419,7 @@
           <a:p>
             <a:fld id="{8A143C70-608A-4F22-B501-746222F42BD2}" type="datetimeFigureOut">
               <a:rPr lang="es-ES" smtClean="0"/>
-              <a:t>15/06/2025</a:t>
+              <a:t>16/06/2025</a:t>
             </a:fld>
             <a:endParaRPr lang="es-ES"/>
           </a:p>
@@ -32880,7 +32885,7 @@
           <a:p>
             <a:fld id="{8A143C70-608A-4F22-B501-746222F42BD2}" type="datetimeFigureOut">
               <a:rPr lang="es-ES" smtClean="0"/>
-              <a:t>15/06/2025</a:t>
+              <a:t>16/06/2025</a:t>
             </a:fld>
             <a:endParaRPr lang="es-ES"/>
           </a:p>
@@ -32998,7 +33003,7 @@
           <a:p>
             <a:fld id="{8A143C70-608A-4F22-B501-746222F42BD2}" type="datetimeFigureOut">
               <a:rPr lang="es-ES" smtClean="0"/>
-              <a:t>15/06/2025</a:t>
+              <a:t>16/06/2025</a:t>
             </a:fld>
             <a:endParaRPr lang="es-ES"/>
           </a:p>
@@ -33093,7 +33098,7 @@
           <a:p>
             <a:fld id="{8A143C70-608A-4F22-B501-746222F42BD2}" type="datetimeFigureOut">
               <a:rPr lang="es-ES" smtClean="0"/>
-              <a:t>15/06/2025</a:t>
+              <a:t>16/06/2025</a:t>
             </a:fld>
             <a:endParaRPr lang="es-ES"/>
           </a:p>
@@ -33348,7 +33353,7 @@
           <a:p>
             <a:fld id="{8A143C70-608A-4F22-B501-746222F42BD2}" type="datetimeFigureOut">
               <a:rPr lang="es-ES" smtClean="0"/>
-              <a:t>15/06/2025</a:t>
+              <a:t>16/06/2025</a:t>
             </a:fld>
             <a:endParaRPr lang="es-ES"/>
           </a:p>
@@ -33648,7 +33653,7 @@
           <a:p>
             <a:fld id="{8A143C70-608A-4F22-B501-746222F42BD2}" type="datetimeFigureOut">
               <a:rPr lang="es-ES" smtClean="0"/>
-              <a:t>15/06/2025</a:t>
+              <a:t>16/06/2025</a:t>
             </a:fld>
             <a:endParaRPr lang="es-ES"/>
           </a:p>
@@ -33882,7 +33887,7 @@
           <a:p>
             <a:fld id="{8A143C70-608A-4F22-B501-746222F42BD2}" type="datetimeFigureOut">
               <a:rPr lang="es-ES" smtClean="0"/>
-              <a:t>15/06/2025</a:t>
+              <a:t>16/06/2025</a:t>
             </a:fld>
             <a:endParaRPr lang="es-ES"/>
           </a:p>
@@ -34862,7 +34867,7 @@
             <p:ph idx="1"/>
             <p:extLst>
               <p:ext uri="{D42A27DB-BD31-4B8C-83A1-F6EECF244321}">
-                <p14:modId xmlns:p14="http://schemas.microsoft.com/office/powerpoint/2010/main" val="3016956600"/>
+                <p14:modId xmlns:p14="http://schemas.microsoft.com/office/powerpoint/2010/main" val="3777424308"/>
               </p:ext>
             </p:extLst>
           </p:nvPr>
@@ -34887,6 +34892,9 @@
   <p:clrMapOvr>
     <a:masterClrMapping/>
   </p:clrMapOvr>
+  <p:transition spd="slow">
+    <p:cover/>
+  </p:transition>
 </p:sld>
 </file>
 
@@ -35002,6 +35010,9 @@
   <p:clrMapOvr>
     <a:masterClrMapping/>
   </p:clrMapOvr>
+  <p:transition spd="slow">
+    <p:cover/>
+  </p:transition>
 </p:sld>
 </file>
 
@@ -35162,6 +35173,9 @@
   <p:clrMapOvr>
     <a:masterClrMapping/>
   </p:clrMapOvr>
+  <p:transition spd="slow">
+    <p:cover/>
+  </p:transition>
 </p:sld>
 </file>
 
@@ -35430,7 +35444,7 @@
           </a:effectLst>
           <a:extLst>
             <a:ext uri="{91240B29-F687-4f45-9708-019B960494DF}">
-              <a14:hiddenLine xmlns="" xmlns:a16="http://schemas.microsoft.com/office/drawing/2014/main" xmlns:p14="http://schemas.microsoft.com/office/powerpoint/2010/main" xmlns:a14="http://schemas.microsoft.com/office/drawing/2010/main" w="9525">
+              <a14:hiddenLine xmlns:a14="http://schemas.microsoft.com/office/drawing/2010/main" xmlns:p14="http://schemas.microsoft.com/office/powerpoint/2010/main" xmlns:a16="http://schemas.microsoft.com/office/drawing/2014/main" xmlns="" w="9525">
                 <a:solidFill>
                   <a:srgbClr val="000000"/>
                 </a:solidFill>
@@ -35684,6 +35698,9 @@
   <p:clrMapOvr>
     <a:masterClrMapping/>
   </p:clrMapOvr>
+  <p:transition spd="slow">
+    <p:cover/>
+  </p:transition>
 </p:sld>
 </file>
 
@@ -35799,6 +35816,9 @@
   <p:clrMapOvr>
     <a:masterClrMapping/>
   </p:clrMapOvr>
+  <p:transition spd="slow">
+    <p:cover/>
+  </p:transition>
 </p:sld>
 </file>
 
@@ -36101,6 +36121,9 @@
   <p:clrMapOvr>
     <a:masterClrMapping/>
   </p:clrMapOvr>
+  <p:transition spd="slow">
+    <p:cover/>
+  </p:transition>
 </p:sld>
 </file>
 
@@ -36291,6 +36314,9 @@
   <p:clrMapOvr>
     <a:masterClrMapping/>
   </p:clrMapOvr>
+  <p:transition spd="slow">
+    <p:push dir="u"/>
+  </p:transition>
 </p:sld>
 </file>
 
@@ -36559,7 +36585,7 @@
           </a:effectLst>
           <a:extLst>
             <a:ext uri="{91240B29-F687-4f45-9708-019B960494DF}">
-              <a14:hiddenLine xmlns="" xmlns:a16="http://schemas.microsoft.com/office/drawing/2014/main" xmlns:p14="http://schemas.microsoft.com/office/powerpoint/2010/main" xmlns:a14="http://schemas.microsoft.com/office/drawing/2010/main" w="9525">
+              <a14:hiddenLine xmlns:a14="http://schemas.microsoft.com/office/drawing/2010/main" xmlns:p14="http://schemas.microsoft.com/office/powerpoint/2010/main" xmlns:a16="http://schemas.microsoft.com/office/drawing/2014/main" xmlns="" w="9525">
                 <a:solidFill>
                   <a:srgbClr val="000000"/>
                 </a:solidFill>
@@ -36659,6 +36685,9 @@
   <p:clrMapOvr>
     <a:masterClrMapping/>
   </p:clrMapOvr>
+  <p:transition spd="slow">
+    <p:push dir="u"/>
+  </p:transition>
 </p:sld>
 </file>
 
@@ -36819,6 +36848,9 @@
   <p:clrMapOvr>
     <a:masterClrMapping/>
   </p:clrMapOvr>
+  <p:transition spd="slow">
+    <p:push dir="u"/>
+  </p:transition>
 </p:sld>
 </file>
 
@@ -37025,6 +37057,9 @@
   <p:clrMapOvr>
     <a:masterClrMapping/>
   </p:clrMapOvr>
+  <p:transition spd="slow">
+    <p:push dir="u"/>
+  </p:transition>
 </p:sld>
 </file>
 

</xml_diff>